<commit_message>
Update to slide conversion
</commit_message>
<xml_diff>
--- a/LectureSlides/06a_WhyInferenceIsImportant.pptx
+++ b/LectureSlides/06a_WhyInferenceIsImportant.pptx
@@ -3396,13 +3396,7 @@
                       <a:rPr>
                         <a:latin typeface="Cambria Math" panose="02040503050406030204" pitchFamily="18" charset="0"/>
                       </a:rPr>
-                      <m:t>1</m:t>
-                    </m:r>
-                    <m:r>
-                      <a:rPr>
-                        <a:latin typeface="Cambria Math" panose="02040503050406030204" pitchFamily="18" charset="0"/>
-                      </a:rPr>
-                      <m:t>−</m:t>
+                      <m:t>1−</m:t>
                     </m:r>
                     <m:r>
                       <a:rPr>
@@ -3631,21 +3625,7 @@
                         <a:latin typeface="Cambria Math" panose="02040503050406030204" pitchFamily="18" charset="0"/>
                         <a:ea typeface="Cambria Math" panose="02040503050406030204" pitchFamily="18" charset="0"/>
                       </a:rPr>
-                      <m:t>−</m:t>
-                    </m:r>
-                    <m:r>
-                      <a:rPr lang="en-US" i="1">
-                        <a:latin typeface="Cambria Math" panose="02040503050406030204" pitchFamily="18" charset="0"/>
-                        <a:ea typeface="Cambria Math" panose="02040503050406030204" pitchFamily="18" charset="0"/>
-                      </a:rPr>
-                      <m:t>∞</m:t>
-                    </m:r>
-                    <m:r>
-                      <a:rPr lang="en-US" i="1">
-                        <a:latin typeface="Cambria Math" panose="02040503050406030204" pitchFamily="18" charset="0"/>
-                        <a:ea typeface="Cambria Math" panose="02040503050406030204" pitchFamily="18" charset="0"/>
-                      </a:rPr>
-                      <m:t>&lt;</m:t>
+                      <m:t>−∞&lt;</m:t>
                     </m:r>
                     <m:r>
                       <a:rPr lang="en-US" i="1">
@@ -3659,14 +3639,7 @@
                         <a:latin typeface="Cambria Math" panose="02040503050406030204" pitchFamily="18" charset="0"/>
                         <a:ea typeface="Cambria Math" panose="02040503050406030204" pitchFamily="18" charset="0"/>
                       </a:rPr>
-                      <m:t>&lt;</m:t>
-                    </m:r>
-                    <m:r>
-                      <a:rPr lang="en-US" i="1">
-                        <a:latin typeface="Cambria Math" panose="02040503050406030204" pitchFamily="18" charset="0"/>
-                        <a:ea typeface="Cambria Math" panose="02040503050406030204" pitchFamily="18" charset="0"/>
-                      </a:rPr>
-                      <m:t>∞</m:t>
+                      <m:t>&lt;∞</m:t>
                     </m:r>
                   </m:oMath>
                 </a14:m>
@@ -3728,13 +3701,7 @@
                             <a:rPr>
                               <a:latin typeface="Cambria Math" panose="02040503050406030204" pitchFamily="18" charset="0"/>
                             </a:rPr>
-                            <m:t>−</m:t>
-                          </m:r>
-                          <m:r>
-                            <a:rPr>
-                              <a:latin typeface="Cambria Math" panose="02040503050406030204" pitchFamily="18" charset="0"/>
-                            </a:rPr>
-                            <m:t>∞</m:t>
+                            <m:t>−∞</m:t>
                           </m:r>
                           <m:r>
                             <a:rPr lang="en-US">
@@ -3806,21 +3773,7 @@
                         <a:latin typeface="Cambria Math" panose="02040503050406030204" pitchFamily="18" charset="0"/>
                         <a:ea typeface="Cambria Math" panose="02040503050406030204" pitchFamily="18" charset="0"/>
                       </a:rPr>
-                      <m:t>−</m:t>
-                    </m:r>
-                    <m:r>
-                      <a:rPr lang="en-US" i="1">
-                        <a:latin typeface="Cambria Math" panose="02040503050406030204" pitchFamily="18" charset="0"/>
-                        <a:ea typeface="Cambria Math" panose="02040503050406030204" pitchFamily="18" charset="0"/>
-                      </a:rPr>
-                      <m:t>∞</m:t>
-                    </m:r>
-                    <m:r>
-                      <a:rPr lang="en-US" i="1">
-                        <a:latin typeface="Cambria Math" panose="02040503050406030204" pitchFamily="18" charset="0"/>
-                        <a:ea typeface="Cambria Math" panose="02040503050406030204" pitchFamily="18" charset="0"/>
-                      </a:rPr>
-                      <m:t>&lt;</m:t>
+                      <m:t>−∞&lt;</m:t>
                     </m:r>
                     <m:r>
                       <a:rPr lang="en-US" i="1">
@@ -3834,14 +3787,7 @@
                         <a:latin typeface="Cambria Math" panose="02040503050406030204" pitchFamily="18" charset="0"/>
                         <a:ea typeface="Cambria Math" panose="02040503050406030204" pitchFamily="18" charset="0"/>
                       </a:rPr>
-                      <m:t>&lt;</m:t>
-                    </m:r>
-                    <m:r>
-                      <a:rPr lang="en-US" i="1">
-                        <a:latin typeface="Cambria Math" panose="02040503050406030204" pitchFamily="18" charset="0"/>
-                        <a:ea typeface="Cambria Math" panose="02040503050406030204" pitchFamily="18" charset="0"/>
-                      </a:rPr>
-                      <m:t>∞</m:t>
+                      <m:t>&lt;∞</m:t>
                     </m:r>
                   </m:oMath>
                 </a14:m>
@@ -3931,13 +3877,7 @@
                             <a:rPr>
                               <a:latin typeface="Cambria Math" panose="02040503050406030204" pitchFamily="18" charset="0"/>
                             </a:rPr>
-                            <m:t>≤</m:t>
-                          </m:r>
-                          <m:r>
-                            <a:rPr>
-                              <a:latin typeface="Cambria Math" panose="02040503050406030204" pitchFamily="18" charset="0"/>
-                            </a:rPr>
-                            <m:t>∞</m:t>
+                            <m:t>≤∞</m:t>
                           </m:r>
                         </m:e>
                       </m:d>
@@ -5346,25 +5286,7 @@
                         <a:rPr lang="en-US" b="0" i="1" smtClean="0">
                           <a:latin typeface="Cambria Math" panose="02040503050406030204" pitchFamily="18" charset="0"/>
                         </a:rPr>
-                        <m:t>=</m:t>
-                      </m:r>
-                      <m:r>
-                        <a:rPr lang="en-US" b="0" i="1" smtClean="0">
-                          <a:latin typeface="Cambria Math" panose="02040503050406030204" pitchFamily="18" charset="0"/>
-                        </a:rPr>
-                        <m:t>0</m:t>
-                      </m:r>
-                      <m:r>
-                        <a:rPr lang="en-US" b="0" i="1" smtClean="0">
-                          <a:latin typeface="Cambria Math" panose="02040503050406030204" pitchFamily="18" charset="0"/>
-                        </a:rPr>
-                        <m:t>.</m:t>
-                      </m:r>
-                      <m:r>
-                        <a:rPr lang="en-US" b="0" i="1" smtClean="0">
-                          <a:latin typeface="Cambria Math" panose="02040503050406030204" pitchFamily="18" charset="0"/>
-                        </a:rPr>
-                        <m:t>05</m:t>
+                        <m:t>=0.05</m:t>
                       </m:r>
                     </m:oMath>
                   </m:oMathPara>
@@ -6546,7 +6468,7 @@
         <p:spPr/>
         <p:txBody>
           <a:bodyPr>
-            <a:normAutofit fontScale="92500" lnSpcReduction="20000"/>
+            <a:normAutofit fontScale="92500" lnSpcReduction="10000"/>
           </a:bodyPr>
           <a:lstStyle/>
           <a:p>
@@ -6568,8 +6490,12 @@
           <a:p>
             <a:pPr lvl="0"/>
             <a:r>
+              <a:rPr lang="en-US" dirty="0"/>
+              <a:t>Statistical i</a:t>
+            </a:r>
+            <a:r>
               <a:rPr dirty="0"/>
-              <a:t>Inferences using statistics must consider the uncertainty in the estimates</a:t>
+              <a:t>nferences must consider the uncertainty in the estimates</a:t>
             </a:r>
           </a:p>
           <a:p>
@@ -6582,10 +6508,11 @@
           <a:p>
             <a:pPr lvl="1"/>
             <a:r>
-              <a:rPr b="1"/>
+              <a:rPr b="1" dirty="0"/>
               <a:t>Two-sided confidence intervals:</a:t>
             </a:r>
             <a:r>
+              <a:rPr dirty="0"/>
               <a:t> express confidence that a value is within some range around the point estimate</a:t>
             </a:r>
           </a:p>
@@ -6604,15 +6531,7 @@
             <a:pPr lvl="0"/>
             <a:r>
               <a:rPr dirty="0"/>
-              <a:t>Hypothesis tests based on the confidence we have that variation in statistic </a:t>
-            </a:r>
-            <a:r>
-              <a:rPr dirty="0" err="1"/>
-              <a:t>arrises</a:t>
-            </a:r>
-            <a:r>
-              <a:rPr dirty="0"/>
-              <a:t> from sampling variation alone</a:t>
+              <a:t>Hypothesis tests based on the confidence we have that variation in statistic arises from sampling variation alone</a:t>
             </a:r>
           </a:p>
         </p:txBody>

</xml_diff>

<commit_message>
Reordered slides and small corrections
</commit_message>
<xml_diff>
--- a/LectureSlides/06a_WhyInferenceIsImportant.pptx
+++ b/LectureSlides/06a_WhyInferenceIsImportant.pptx
@@ -320,7 +320,7 @@
           <a:p>
             <a:fld id="{241EB5C9-1307-BA42-ABA2-0BC069CD8E7F}" type="datetimeFigureOut">
               <a:rPr lang="en-US" smtClean="0"/>
-              <a:t>9/11/2024</a:t>
+              <a:t>9/24/2024</a:t>
             </a:fld>
             <a:endParaRPr lang="en-US"/>
           </a:p>
@@ -488,7 +488,7 @@
           <a:p>
             <a:fld id="{241EB5C9-1307-BA42-ABA2-0BC069CD8E7F}" type="datetimeFigureOut">
               <a:rPr lang="en-US" smtClean="0"/>
-              <a:t>9/11/2024</a:t>
+              <a:t>9/24/2024</a:t>
             </a:fld>
             <a:endParaRPr lang="en-US"/>
           </a:p>
@@ -666,7 +666,7 @@
           <a:p>
             <a:fld id="{241EB5C9-1307-BA42-ABA2-0BC069CD8E7F}" type="datetimeFigureOut">
               <a:rPr lang="en-US" smtClean="0"/>
-              <a:t>9/11/2024</a:t>
+              <a:t>9/24/2024</a:t>
             </a:fld>
             <a:endParaRPr lang="en-US"/>
           </a:p>
@@ -834,7 +834,7 @@
           <a:p>
             <a:fld id="{241EB5C9-1307-BA42-ABA2-0BC069CD8E7F}" type="datetimeFigureOut">
               <a:rPr lang="en-US" smtClean="0"/>
-              <a:t>9/11/2024</a:t>
+              <a:t>9/24/2024</a:t>
             </a:fld>
             <a:endParaRPr lang="en-US"/>
           </a:p>
@@ -1079,7 +1079,7 @@
           <a:p>
             <a:fld id="{241EB5C9-1307-BA42-ABA2-0BC069CD8E7F}" type="datetimeFigureOut">
               <a:rPr lang="en-US" smtClean="0"/>
-              <a:t>9/11/2024</a:t>
+              <a:t>9/24/2024</a:t>
             </a:fld>
             <a:endParaRPr lang="en-US"/>
           </a:p>
@@ -1364,7 +1364,7 @@
           <a:p>
             <a:fld id="{241EB5C9-1307-BA42-ABA2-0BC069CD8E7F}" type="datetimeFigureOut">
               <a:rPr lang="en-US" smtClean="0"/>
-              <a:t>9/11/2024</a:t>
+              <a:t>9/24/2024</a:t>
             </a:fld>
             <a:endParaRPr lang="en-US"/>
           </a:p>
@@ -1783,7 +1783,7 @@
           <a:p>
             <a:fld id="{241EB5C9-1307-BA42-ABA2-0BC069CD8E7F}" type="datetimeFigureOut">
               <a:rPr lang="en-US" smtClean="0"/>
-              <a:t>9/11/2024</a:t>
+              <a:t>9/24/2024</a:t>
             </a:fld>
             <a:endParaRPr lang="en-US"/>
           </a:p>
@@ -1900,7 +1900,7 @@
           <a:p>
             <a:fld id="{241EB5C9-1307-BA42-ABA2-0BC069CD8E7F}" type="datetimeFigureOut">
               <a:rPr lang="en-US" smtClean="0"/>
-              <a:t>9/11/2024</a:t>
+              <a:t>9/24/2024</a:t>
             </a:fld>
             <a:endParaRPr lang="en-US"/>
           </a:p>
@@ -1995,7 +1995,7 @@
           <a:p>
             <a:fld id="{241EB5C9-1307-BA42-ABA2-0BC069CD8E7F}" type="datetimeFigureOut">
               <a:rPr lang="en-US" smtClean="0"/>
-              <a:t>9/11/2024</a:t>
+              <a:t>9/24/2024</a:t>
             </a:fld>
             <a:endParaRPr lang="en-US"/>
           </a:p>
@@ -2270,7 +2270,7 @@
           <a:p>
             <a:fld id="{241EB5C9-1307-BA42-ABA2-0BC069CD8E7F}" type="datetimeFigureOut">
               <a:rPr lang="en-US" smtClean="0"/>
-              <a:t>9/11/2024</a:t>
+              <a:t>9/24/2024</a:t>
             </a:fld>
             <a:endParaRPr lang="en-US"/>
           </a:p>
@@ -2522,7 +2522,7 @@
           <a:p>
             <a:fld id="{241EB5C9-1307-BA42-ABA2-0BC069CD8E7F}" type="datetimeFigureOut">
               <a:rPr lang="en-US" smtClean="0"/>
-              <a:t>9/11/2024</a:t>
+              <a:t>9/24/2024</a:t>
             </a:fld>
             <a:endParaRPr lang="en-US"/>
           </a:p>
@@ -2733,7 +2733,7 @@
           <a:p>
             <a:fld id="{241EB5C9-1307-BA42-ABA2-0BC069CD8E7F}" type="datetimeFigureOut">
               <a:rPr lang="en-US" smtClean="0"/>
-              <a:t>9/11/2024</a:t>
+              <a:t>9/24/2024</a:t>
             </a:fld>
             <a:endParaRPr lang="en-US"/>
           </a:p>
@@ -3337,8 +3337,8 @@
           </a:p>
         </p:txBody>
       </p:sp>
-      <mc:AlternateContent xmlns:mc="http://schemas.openxmlformats.org/markup-compatibility/2006" xmlns:a14="http://schemas.microsoft.com/office/drawing/2010/main">
-        <mc:Choice Requires="a14">
+      <mc:AlternateContent xmlns:mc="http://schemas.openxmlformats.org/markup-compatibility/2006">
+        <mc:Choice xmlns:a14="http://schemas.microsoft.com/office/drawing/2010/main" Requires="a14">
           <p:sp>
             <p:nvSpPr>
               <p:cNvPr id="3" name="Content Placeholder 2"/>
@@ -3374,7 +3374,31 @@
                 </a:r>
                 <a:r>
                   <a:rPr dirty="0"/>
-                  <a:t> confidence interval by looking at either </a:t>
+                  <a:t> </a:t>
+                </a:r>
+                <a:r>
+                  <a:rPr b="1" dirty="0"/>
+                  <a:t>confidence interval </a:t>
+                </a:r>
+                <a:r>
+                  <a:rPr dirty="0"/>
+                  <a:t>by </a:t>
+                </a:r>
+                <a:r>
+                  <a:rPr lang="en-US" dirty="0"/>
+                  <a:t>considering</a:t>
+                </a:r>
+                <a:r>
+                  <a:rPr dirty="0"/>
+                  <a:t> either</a:t>
+                </a:r>
+                <a:r>
+                  <a:rPr lang="en-US" dirty="0"/>
+                  <a:t> the </a:t>
+                </a:r>
+                <a:r>
+                  <a:rPr dirty="0"/>
+                  <a:t> </a:t>
                 </a:r>
                 <a14:m>
                   <m:oMath xmlns:m="http://schemas.openxmlformats.org/officeDocument/2006/math">
@@ -3889,7 +3913,7 @@
             </p:txBody>
           </p:sp>
         </mc:Choice>
-        <mc:Fallback xmlns="">
+        <mc:Fallback>
           <p:sp>
             <p:nvSpPr>
               <p:cNvPr id="3" name="Content Placeholder 2"/>
@@ -3984,8 +4008,8 @@
           </a:p>
         </p:txBody>
       </p:sp>
-      <mc:AlternateContent xmlns:mc="http://schemas.openxmlformats.org/markup-compatibility/2006" xmlns:a14="http://schemas.microsoft.com/office/drawing/2010/main">
-        <mc:Choice Requires="a14">
+      <mc:AlternateContent xmlns:mc="http://schemas.openxmlformats.org/markup-compatibility/2006">
+        <mc:Choice xmlns:a14="http://schemas.microsoft.com/office/drawing/2010/main" Requires="a14">
           <p:sp>
             <p:nvSpPr>
               <p:cNvPr id="4" name="Text Placeholder 3"/>
@@ -4012,8 +4036,12 @@
                   <a:buNone/>
                 </a:pPr>
                 <a:r>
+                  <a:rPr lang="en-US" sz="1600" dirty="0"/>
+                  <a:t>Example of </a:t>
+                </a:r>
+                <a:r>
                   <a:rPr sz="1600" dirty="0"/>
-                  <a:t>Illustrate the concept of confidence intervals with an example</a:t>
+                  <a:t>confidence intervals</a:t>
                 </a:r>
               </a:p>
               <a:p>
@@ -4022,8 +4050,12 @@
                   <a:buChar char="•"/>
                 </a:pPr>
                 <a:r>
+                  <a:rPr lang="en-US" sz="1600" dirty="0"/>
+                  <a:t>Plot of the</a:t>
+                </a:r>
+                <a:r>
                   <a:rPr sz="1600" dirty="0"/>
-                  <a:t>The </a:t>
+                  <a:t> </a:t>
                 </a:r>
                 <a:r>
                   <a:rPr sz="1600" b="1" dirty="0"/>
@@ -4085,7 +4117,7 @@
                 </a:pPr>
                 <a:r>
                   <a:rPr sz="1600" dirty="0"/>
-                  <a:t>Double ended arrows with annotation are plotted to illustrate the </a:t>
+                  <a:t>Double ended arrows with annotation illustrate the </a:t>
                 </a:r>
                 <a:r>
                   <a:rPr sz="1600" b="1" dirty="0"/>
@@ -4132,7 +4164,7 @@
             </p:txBody>
           </p:sp>
         </mc:Choice>
-        <mc:Fallback xmlns="">
+        <mc:Fallback>
           <p:sp>
             <p:nvSpPr>
               <p:cNvPr id="4" name="Text Placeholder 3"/>
@@ -4151,7 +4183,7 @@
               <a:blipFill>
                 <a:blip r:embed="rId2"/>
                 <a:stretch>
-                  <a:fillRect l="-887" t="-442" b="-4271"/>
+                  <a:fillRect l="-887" t="-442"/>
                 </a:stretch>
               </a:blipFill>
             </p:spPr>
@@ -4172,10 +4204,10 @@
       </mc:AlternateContent>
       <p:pic>
         <p:nvPicPr>
-          <p:cNvPr id="6" name="Picture 5">
+          <p:cNvPr id="8" name="Picture 7">
             <a:extLst>
               <a:ext uri="{FF2B5EF4-FFF2-40B4-BE49-F238E27FC236}">
-                <a16:creationId xmlns:a16="http://schemas.microsoft.com/office/drawing/2014/main" id="{428376FB-DFD1-424B-DD65-CDF9E8E3C2D8}"/>
+                <a16:creationId xmlns:a16="http://schemas.microsoft.com/office/drawing/2014/main" id="{03A0741C-3B59-F5F2-E6D6-2827D90634BB}"/>
               </a:ext>
             </a:extLst>
           </p:cNvPr>
@@ -4192,8 +4224,8 @@
         </p:blipFill>
         <p:spPr>
           <a:xfrm>
-            <a:off x="3933370" y="616857"/>
-            <a:ext cx="5210629" cy="4286129"/>
+            <a:off x="3897086" y="787845"/>
+            <a:ext cx="5203200" cy="4150868"/>
           </a:xfrm>
           <a:prstGeom prst="rect">
             <a:avLst/>
@@ -4821,8 +4853,8 @@
           </a:p>
         </p:txBody>
       </p:sp>
-      <mc:AlternateContent xmlns:mc="http://schemas.openxmlformats.org/markup-compatibility/2006" xmlns:a14="http://schemas.microsoft.com/office/drawing/2010/main">
-        <mc:Choice Requires="a14">
+      <mc:AlternateContent xmlns:mc="http://schemas.openxmlformats.org/markup-compatibility/2006">
+        <mc:Choice xmlns:a14="http://schemas.microsoft.com/office/drawing/2010/main" Requires="a14">
           <p:sp>
             <p:nvSpPr>
               <p:cNvPr id="3" name="Content Placeholder 2"/>
@@ -4857,15 +4889,7 @@
                 <a:pPr lvl="0"/>
                 <a:r>
                   <a:rPr dirty="0"/>
-                  <a:t>Confidence intervals are with respect to the </a:t>
-                </a:r>
-                <a:r>
-                  <a:rPr dirty="0" err="1"/>
-                  <a:t>the</a:t>
-                </a:r>
-                <a:r>
-                  <a:rPr dirty="0"/>
-                  <a:t> sampling distribution of a statistic </a:t>
+                  <a:t>Confidence intervals are with respect to the sampling distribution of a statistic </a:t>
                 </a:r>
                 <a14:m>
                   <m:oMath xmlns:m="http://schemas.openxmlformats.org/officeDocument/2006/math">
@@ -5017,7 +5041,7 @@
             </p:txBody>
           </p:sp>
         </mc:Choice>
-        <mc:Fallback xmlns="">
+        <mc:Fallback>
           <p:sp>
             <p:nvSpPr>
               <p:cNvPr id="3" name="Content Placeholder 2"/>
@@ -5286,7 +5310,25 @@
                         <a:rPr lang="en-US" b="0" i="1" smtClean="0">
                           <a:latin typeface="Cambria Math" panose="02040503050406030204" pitchFamily="18" charset="0"/>
                         </a:rPr>
-                        <m:t>=0.05</m:t>
+                        <m:t>=</m:t>
+                      </m:r>
+                      <m:r>
+                        <a:rPr lang="en-US" b="0" i="1" smtClean="0">
+                          <a:latin typeface="Cambria Math" panose="02040503050406030204" pitchFamily="18" charset="0"/>
+                        </a:rPr>
+                        <m:t>0</m:t>
+                      </m:r>
+                      <m:r>
+                        <a:rPr lang="en-US" b="0" i="1" smtClean="0">
+                          <a:latin typeface="Cambria Math" panose="02040503050406030204" pitchFamily="18" charset="0"/>
+                        </a:rPr>
+                        <m:t>.</m:t>
+                      </m:r>
+                      <m:r>
+                        <a:rPr lang="en-US" b="0" i="1" smtClean="0">
+                          <a:latin typeface="Cambria Math" panose="02040503050406030204" pitchFamily="18" charset="0"/>
+                        </a:rPr>
+                        <m:t>05</m:t>
                       </m:r>
                     </m:oMath>
                   </m:oMathPara>
@@ -7086,16 +7128,24 @@
           <a:p>
             <a:pPr lvl="1"/>
             <a:r>
+              <a:rPr lang="en-US" dirty="0"/>
+              <a:t>The</a:t>
+            </a:r>
+            <a:r>
               <a:rPr dirty="0"/>
-              <a:t>A </a:t>
+              <a:t> </a:t>
             </a:r>
             <a:r>
               <a:rPr b="1" dirty="0"/>
               <a:t>null hypothesis</a:t>
             </a:r>
             <a:r>
+              <a:rPr lang="en-US" b="1" dirty="0"/>
+              <a:t>; </a:t>
+            </a:r>
+            <a:r>
               <a:rPr dirty="0"/>
-              <a:t> is the hypothesis that the distributions are the same</a:t>
+              <a:t>the distributions are the same</a:t>
             </a:r>
           </a:p>
           <a:p>
@@ -7131,23 +7181,34 @@
               <a:t>uncertainty in model parameter </a:t>
             </a:r>
             <a:r>
+              <a:rPr dirty="0"/>
               <a:t>estimate</a:t>
             </a:r>
             <a:r>
-              <a:rPr lang="en-US"/>
+              <a:rPr lang="en-US" dirty="0"/>
               <a:t>s   </a:t>
             </a:r>
-            <a:endParaRPr lang="en-US" dirty="0"/>
           </a:p>
           <a:p>
             <a:pPr lvl="1"/>
             <a:r>
+              <a:rPr lang="en-US" dirty="0"/>
+              <a:t>Test hypothesis that the parameter values are not significant </a:t>
+            </a:r>
+          </a:p>
+          <a:p>
+            <a:pPr lvl="1"/>
+            <a:r>
+              <a:rPr lang="en-US" dirty="0"/>
+              <a:t>Test if differences in model</a:t>
+            </a:r>
+            <a:r>
               <a:rPr dirty="0"/>
-              <a:t>Compare model performance</a:t>
+              <a:t> performance</a:t>
             </a:r>
             <a:r>
               <a:rPr lang="en-US" dirty="0"/>
-              <a:t>    </a:t>
+              <a:t> is significant   </a:t>
             </a:r>
             <a:endParaRPr dirty="0"/>
           </a:p>
@@ -7357,7 +7418,23 @@
             </a:r>
             <a:r>
               <a:rPr dirty="0"/>
-              <a:t>, or </a:t>
+              <a:t>,</a:t>
+            </a:r>
+            <a:r>
+              <a:rPr lang="en-US" dirty="0"/>
+              <a:t> </a:t>
+            </a:r>
+            <a:r>
+              <a:rPr lang="en-US" b="1" dirty="0"/>
+              <a:t>count</a:t>
+            </a:r>
+            <a:r>
+              <a:rPr lang="en-US" dirty="0"/>
+              <a:t>,</a:t>
+            </a:r>
+            <a:r>
+              <a:rPr dirty="0"/>
+              <a:t> or </a:t>
             </a:r>
             <a:r>
               <a:rPr b="1" dirty="0"/>
@@ -7760,7 +7837,7 @@
         </p:spPr>
         <p:txBody>
           <a:bodyPr>
-            <a:normAutofit fontScale="92500" lnSpcReduction="10000"/>
+            <a:normAutofit fontScale="92500" lnSpcReduction="20000"/>
           </a:bodyPr>
           <a:lstStyle/>
           <a:p>
@@ -7786,7 +7863,14 @@
               <a:rPr b="1" dirty="0"/>
               <a:t>point estimate</a:t>
             </a:r>
-            <a:endParaRPr lang="en-US" b="1" dirty="0"/>
+            <a:r>
+              <a:rPr lang="en-US" dirty="0"/>
+              <a:t> from </a:t>
+            </a:r>
+            <a:r>
+              <a:rPr lang="en-US" b="1" dirty="0"/>
+              <a:t>random sampling alone</a:t>
+            </a:r>
           </a:p>
           <a:p>
             <a:pPr lvl="1"/>
@@ -7804,7 +7888,7 @@
             </a:r>
             <a:r>
               <a:rPr lang="en-US" dirty="0"/>
-              <a:t> from the observations</a:t>
+              <a:t> from the sampled observations</a:t>
             </a:r>
             <a:endParaRPr dirty="0"/>
           </a:p>
@@ -7871,7 +7955,15 @@
             </a:r>
             <a:r>
               <a:rPr dirty="0"/>
-              <a:t> express confidence that a value is within some range around the point estimate</a:t>
+              <a:t> express confidence that a </a:t>
+            </a:r>
+            <a:r>
+              <a:rPr lang="en-US" dirty="0"/>
+              <a:t>sample estimate </a:t>
+            </a:r>
+            <a:r>
+              <a:rPr dirty="0"/>
+              <a:t>is within some range around the point estimate</a:t>
             </a:r>
           </a:p>
           <a:p>
@@ -7882,7 +7974,15 @@
             </a:r>
             <a:r>
               <a:rPr dirty="0"/>
-              <a:t> express confidence that the point estimate is greater or less than some range of values</a:t>
+              <a:t> express confidence that the </a:t>
+            </a:r>
+            <a:r>
+              <a:rPr lang="en-US" dirty="0"/>
+              <a:t>sample</a:t>
+            </a:r>
+            <a:r>
+              <a:rPr dirty="0"/>
+              <a:t> estimate is greater or less than some range of values</a:t>
             </a:r>
           </a:p>
         </p:txBody>
@@ -7936,8 +8036,8 @@
           </a:p>
         </p:txBody>
       </p:sp>
-      <mc:AlternateContent xmlns:mc="http://schemas.openxmlformats.org/markup-compatibility/2006" xmlns:a14="http://schemas.microsoft.com/office/drawing/2010/main">
-        <mc:Choice Requires="a14">
+      <mc:AlternateContent xmlns:mc="http://schemas.openxmlformats.org/markup-compatibility/2006">
+        <mc:Choice xmlns:a14="http://schemas.microsoft.com/office/drawing/2010/main" Requires="a14">
           <p:sp>
             <p:nvSpPr>
               <p:cNvPr id="3" name="Content Placeholder 2"/>
@@ -7973,35 +8073,114 @@
                 </a:r>
                 <a:r>
                   <a:rPr lang="en-US" dirty="0"/>
-                  <a:t> confidence interval by looking at the </a:t>
+                  <a:t> </a:t>
+                </a:r>
+                <a:r>
+                  <a:rPr lang="en-US" b="1" dirty="0"/>
+                  <a:t>confidence interval </a:t>
+                </a:r>
+                <a:r>
+                  <a:rPr lang="en-US" dirty="0"/>
+                  <a:t>by as the range of the distribution with </a:t>
                 </a:r>
                 <a14:m>
                   <m:oMath xmlns:m="http://schemas.openxmlformats.org/officeDocument/2006/math">
+                    <m:r>
+                      <a:rPr lang="en-US" smtClean="0">
+                        <a:latin typeface="Cambria Math" panose="02040503050406030204" pitchFamily="18" charset="0"/>
+                      </a:rPr>
+                      <m:t>𝑃</m:t>
+                    </m:r>
+                    <m:d>
+                      <m:dPr>
+                        <m:ctrlPr>
+                          <a:rPr lang="ar-AE" i="1" smtClean="0">
+                            <a:latin typeface="Cambria Math" panose="02040503050406030204" pitchFamily="18" charset="0"/>
+                          </a:rPr>
+                        </m:ctrlPr>
+                      </m:dPr>
+                      <m:e>
+                        <m:r>
+                          <a:rPr lang="ar-AE">
+                            <a:latin typeface="Cambria Math" panose="02040503050406030204" pitchFamily="18" charset="0"/>
+                          </a:rPr>
+                          <m:t>𝐱</m:t>
+                        </m:r>
+                      </m:e>
+                    </m:d>
+                    <m:r>
+                      <a:rPr lang="en-US" b="0" i="1" smtClean="0">
+                        <a:latin typeface="Cambria Math" panose="02040503050406030204" pitchFamily="18" charset="0"/>
+                        <a:ea typeface="Cambria Math" panose="02040503050406030204" pitchFamily="18" charset="0"/>
+                      </a:rPr>
+                      <m:t>=</m:t>
+                    </m:r>
+                    <m:r>
+                      <a:rPr lang="en-US" b="0" i="0" smtClean="0">
+                        <a:latin typeface="Cambria Math" panose="02040503050406030204" pitchFamily="18" charset="0"/>
+                        <a:ea typeface="Cambria Math" panose="02040503050406030204" pitchFamily="18" charset="0"/>
+                      </a:rPr>
+                      <m:t>1</m:t>
+                    </m:r>
+                    <m:r>
+                      <a:rPr lang="en-US" b="0" i="0" smtClean="0">
+                        <a:latin typeface="Cambria Math" panose="02040503050406030204" pitchFamily="18" charset="0"/>
+                        <a:ea typeface="Cambria Math" panose="02040503050406030204" pitchFamily="18" charset="0"/>
+                      </a:rPr>
+                      <m:t>−</m:t>
+                    </m:r>
                     <m:r>
                       <a:rPr lang="en-US">
                         <a:latin typeface="Cambria Math" panose="02040503050406030204" pitchFamily="18" charset="0"/>
                       </a:rPr>
                       <m:t>𝛼</m:t>
                     </m:r>
-                    <m:r>
-                      <a:rPr lang="en-US">
-                        <a:latin typeface="Cambria Math" panose="02040503050406030204" pitchFamily="18" charset="0"/>
-                      </a:rPr>
-                      <m:t>/2</m:t>
-                    </m:r>
                   </m:oMath>
                 </a14:m>
+                <a:endParaRPr lang="en-US" dirty="0"/>
+              </a:p>
+              <a:p>
+                <a:pPr lvl="0"/>
                 <a:r>
                   <a:rPr lang="en-US" dirty="0"/>
-                  <a:t> and </a:t>
+                  <a:t>Confidence interval corresponds to the span between </a:t>
                 </a:r>
                 <a14:m>
                   <m:oMath xmlns:m="http://schemas.openxmlformats.org/officeDocument/2006/math">
+                    <m:sSub>
+                      <m:sSubPr>
+                        <m:ctrlPr>
+                          <a:rPr lang="en-US" i="1">
+                            <a:latin typeface="Cambria Math" panose="02040503050406030204" pitchFamily="18" charset="0"/>
+                            <a:ea typeface="Cambria Math" panose="02040503050406030204" pitchFamily="18" charset="0"/>
+                          </a:rPr>
+                        </m:ctrlPr>
+                      </m:sSubPr>
+                      <m:e>
+                        <m:r>
+                          <a:rPr lang="en-US" i="1">
+                            <a:latin typeface="Cambria Math" panose="02040503050406030204" pitchFamily="18" charset="0"/>
+                            <a:ea typeface="Cambria Math" panose="02040503050406030204" pitchFamily="18" charset="0"/>
+                          </a:rPr>
+                          <m:t>𝐶𝐼</m:t>
+                        </m:r>
+                      </m:e>
+                      <m:sub>
+                        <m:r>
+                          <a:rPr lang="en-US" i="1">
+                            <a:latin typeface="Cambria Math" panose="02040503050406030204" pitchFamily="18" charset="0"/>
+                            <a:ea typeface="Cambria Math" panose="02040503050406030204" pitchFamily="18" charset="0"/>
+                          </a:rPr>
+                          <m:t>𝑙𝑜𝑤𝑒𝑟</m:t>
+                        </m:r>
+                      </m:sub>
+                    </m:sSub>
                     <m:r>
-                      <a:rPr lang="en-US">
+                      <a:rPr lang="en-US" b="0" i="0" smtClean="0">
                         <a:latin typeface="Cambria Math" panose="02040503050406030204" pitchFamily="18" charset="0"/>
+                        <a:ea typeface="Cambria Math" panose="02040503050406030204" pitchFamily="18" charset="0"/>
                       </a:rPr>
-                      <m:t>1−</m:t>
+                      <m:t>=</m:t>
                     </m:r>
                     <m:r>
                       <a:rPr lang="en-US">
@@ -8013,20 +8192,99 @@
                       <a:rPr lang="en-US">
                         <a:latin typeface="Cambria Math" panose="02040503050406030204" pitchFamily="18" charset="0"/>
                       </a:rPr>
-                      <m:t>/2</m:t>
+                      <m:t>/</m:t>
+                    </m:r>
+                    <m:r>
+                      <a:rPr lang="en-US" b="0" i="0" smtClean="0">
+                        <a:latin typeface="Cambria Math" panose="02040503050406030204" pitchFamily="18" charset="0"/>
+                      </a:rPr>
+                      <m:t>2</m:t>
                     </m:r>
                   </m:oMath>
                 </a14:m>
                 <a:r>
                   <a:rPr lang="en-US" dirty="0"/>
+                  <a:t> and</a:t>
+                </a:r>
+                <a14:m>
+                  <m:oMath xmlns:m="http://schemas.openxmlformats.org/officeDocument/2006/math">
+                    <m:sSub>
+                      <m:sSubPr>
+                        <m:ctrlPr>
+                          <a:rPr lang="en-US" i="1">
+                            <a:latin typeface="Cambria Math" panose="02040503050406030204" pitchFamily="18" charset="0"/>
+                            <a:ea typeface="Cambria Math" panose="02040503050406030204" pitchFamily="18" charset="0"/>
+                          </a:rPr>
+                        </m:ctrlPr>
+                      </m:sSubPr>
+                      <m:e>
+                        <m:r>
+                          <a:rPr lang="en-US" b="0" i="1" smtClean="0">
+                            <a:latin typeface="Cambria Math" panose="02040503050406030204" pitchFamily="18" charset="0"/>
+                            <a:ea typeface="Cambria Math" panose="02040503050406030204" pitchFamily="18" charset="0"/>
+                          </a:rPr>
+                          <m:t> </m:t>
+                        </m:r>
+                        <m:r>
+                          <a:rPr lang="en-US" i="1">
+                            <a:latin typeface="Cambria Math" panose="02040503050406030204" pitchFamily="18" charset="0"/>
+                            <a:ea typeface="Cambria Math" panose="02040503050406030204" pitchFamily="18" charset="0"/>
+                          </a:rPr>
+                          <m:t>𝐶𝐼</m:t>
+                        </m:r>
+                      </m:e>
+                      <m:sub>
+                        <m:r>
+                          <a:rPr lang="en-US" i="1">
+                            <a:latin typeface="Cambria Math" panose="02040503050406030204" pitchFamily="18" charset="0"/>
+                            <a:ea typeface="Cambria Math" panose="02040503050406030204" pitchFamily="18" charset="0"/>
+                          </a:rPr>
+                          <m:t>𝑢𝑝𝑝𝑒𝑟</m:t>
+                        </m:r>
+                      </m:sub>
+                    </m:sSub>
+                    <m:r>
+                      <a:rPr lang="en-US" b="0" i="0" smtClean="0">
+                        <a:latin typeface="Cambria Math" panose="02040503050406030204" pitchFamily="18" charset="0"/>
+                        <a:ea typeface="Cambria Math" panose="02040503050406030204" pitchFamily="18" charset="0"/>
+                      </a:rPr>
+                      <m:t>=</m:t>
+                    </m:r>
+                    <m:r>
+                      <a:rPr lang="en-US">
+                        <a:latin typeface="Cambria Math" panose="02040503050406030204" pitchFamily="18" charset="0"/>
+                      </a:rPr>
+                      <m:t>1</m:t>
+                    </m:r>
+                    <m:r>
+                      <a:rPr lang="en-US">
+                        <a:latin typeface="Cambria Math" panose="02040503050406030204" pitchFamily="18" charset="0"/>
+                      </a:rPr>
+                      <m:t>−</m:t>
+                    </m:r>
+                    <m:r>
+                      <a:rPr lang="en-US">
+                        <a:latin typeface="Cambria Math" panose="02040503050406030204" pitchFamily="18" charset="0"/>
+                      </a:rPr>
+                      <m:t>𝛼</m:t>
+                    </m:r>
+                    <m:r>
+                      <a:rPr lang="en-US">
+                        <a:latin typeface="Cambria Math" panose="02040503050406030204" pitchFamily="18" charset="0"/>
+                      </a:rPr>
+                      <m:t>/</m:t>
+                    </m:r>
+                    <m:r>
+                      <a:rPr lang="en-US">
+                        <a:latin typeface="Cambria Math" panose="02040503050406030204" pitchFamily="18" charset="0"/>
+                      </a:rPr>
+                      <m:t>2</m:t>
+                    </m:r>
+                  </m:oMath>
+                </a14:m>
+                <a:r>
+                  <a:rPr lang="en-US" dirty="0"/>
                   <a:t> quantiles of a distribution</a:t>
-                </a:r>
-              </a:p>
-              <a:p>
-                <a:pPr lvl="0"/>
-                <a:r>
-                  <a:rPr lang="en-US" dirty="0"/>
-                  <a:t>Confidence interval corresponds to the span of the distribution between quantiles</a:t>
                 </a:r>
               </a:p>
               <a:p>
@@ -8051,7 +8309,7 @@
                 </a14:m>
                 <a:r>
                   <a:rPr lang="en-US" dirty="0"/>
-                  <a:t>, in terms of the probability as:</a:t>
+                  <a:t>, in terms of the probability:</a:t>
                 </a:r>
               </a:p>
               <a:p>
@@ -8500,7 +8758,7 @@
             </p:txBody>
           </p:sp>
         </mc:Choice>
-        <mc:Fallback xmlns="">
+        <mc:Fallback>
           <p:sp>
             <p:nvSpPr>
               <p:cNvPr id="3" name="Content Placeholder 2"/>

</xml_diff>

<commit_message>
Small updates from class
</commit_message>
<xml_diff>
--- a/LectureSlides/06a_WhyInferenceIsImportant.pptx
+++ b/LectureSlides/06a_WhyInferenceIsImportant.pptx
@@ -3337,8 +3337,8 @@
           </a:p>
         </p:txBody>
       </p:sp>
-      <mc:AlternateContent xmlns:mc="http://schemas.openxmlformats.org/markup-compatibility/2006" xmlns:a14="http://schemas.microsoft.com/office/drawing/2010/main">
-        <mc:Choice Requires="a14">
+      <mc:AlternateContent xmlns:mc="http://schemas.openxmlformats.org/markup-compatibility/2006">
+        <mc:Choice xmlns:a14="http://schemas.microsoft.com/office/drawing/2010/main" Requires="a14">
           <p:sp>
             <p:nvSpPr>
               <p:cNvPr id="3" name="Content Placeholder 2"/>
@@ -3746,7 +3746,7 @@
               <a:p>
                 <a:r>
                   <a:rPr lang="en-US" dirty="0"/>
-                  <a:t>For a distribution with support</a:t>
+                  <a:t>For a distribution with support </a:t>
                 </a:r>
                 <a14:m>
                   <m:oMath xmlns:m="http://schemas.openxmlformats.org/officeDocument/2006/math">
@@ -4059,7 +4059,7 @@
             </p:txBody>
           </p:sp>
         </mc:Choice>
-        <mc:Fallback xmlns="">
+        <mc:Fallback>
           <p:sp>
             <p:nvSpPr>
               <p:cNvPr id="3" name="Content Placeholder 2"/>
@@ -4229,7 +4229,13 @@
                       <a:rPr>
                         <a:latin typeface="Cambria Math" panose="02040503050406030204" pitchFamily="18" charset="0"/>
                       </a:rPr>
-                      <m:t>1−</m:t>
+                      <m:t>1</m:t>
+                    </m:r>
+                    <m:r>
+                      <a:rPr>
+                        <a:latin typeface="Cambria Math" panose="02040503050406030204" pitchFamily="18" charset="0"/>
+                      </a:rPr>
+                      <m:t>−</m:t>
                     </m:r>
                     <m:r>
                       <a:rPr>
@@ -4458,7 +4464,21 @@
                         <a:latin typeface="Cambria Math" panose="02040503050406030204" pitchFamily="18" charset="0"/>
                         <a:ea typeface="Cambria Math" panose="02040503050406030204" pitchFamily="18" charset="0"/>
                       </a:rPr>
-                      <m:t>−∞&lt;</m:t>
+                      <m:t>−</m:t>
+                    </m:r>
+                    <m:r>
+                      <a:rPr lang="en-US" i="1">
+                        <a:latin typeface="Cambria Math" panose="02040503050406030204" pitchFamily="18" charset="0"/>
+                        <a:ea typeface="Cambria Math" panose="02040503050406030204" pitchFamily="18" charset="0"/>
+                      </a:rPr>
+                      <m:t>∞</m:t>
+                    </m:r>
+                    <m:r>
+                      <a:rPr lang="en-US" i="1">
+                        <a:latin typeface="Cambria Math" panose="02040503050406030204" pitchFamily="18" charset="0"/>
+                        <a:ea typeface="Cambria Math" panose="02040503050406030204" pitchFamily="18" charset="0"/>
+                      </a:rPr>
+                      <m:t>&lt;</m:t>
                     </m:r>
                     <m:r>
                       <a:rPr lang="en-US" i="1">
@@ -4472,7 +4492,14 @@
                         <a:latin typeface="Cambria Math" panose="02040503050406030204" pitchFamily="18" charset="0"/>
                         <a:ea typeface="Cambria Math" panose="02040503050406030204" pitchFamily="18" charset="0"/>
                       </a:rPr>
-                      <m:t>&lt;∞</m:t>
+                      <m:t>&lt;</m:t>
+                    </m:r>
+                    <m:r>
+                      <a:rPr lang="en-US" i="1">
+                        <a:latin typeface="Cambria Math" panose="02040503050406030204" pitchFamily="18" charset="0"/>
+                        <a:ea typeface="Cambria Math" panose="02040503050406030204" pitchFamily="18" charset="0"/>
+                      </a:rPr>
+                      <m:t>∞</m:t>
                     </m:r>
                   </m:oMath>
                 </a14:m>
@@ -4534,7 +4561,13 @@
                             <a:rPr>
                               <a:latin typeface="Cambria Math" panose="02040503050406030204" pitchFamily="18" charset="0"/>
                             </a:rPr>
-                            <m:t>−∞</m:t>
+                            <m:t>−</m:t>
+                          </m:r>
+                          <m:r>
+                            <a:rPr>
+                              <a:latin typeface="Cambria Math" panose="02040503050406030204" pitchFamily="18" charset="0"/>
+                            </a:rPr>
+                            <m:t>∞</m:t>
                           </m:r>
                           <m:r>
                             <a:rPr lang="en-US">
@@ -4606,7 +4639,21 @@
                         <a:latin typeface="Cambria Math" panose="02040503050406030204" pitchFamily="18" charset="0"/>
                         <a:ea typeface="Cambria Math" panose="02040503050406030204" pitchFamily="18" charset="0"/>
                       </a:rPr>
-                      <m:t>−∞&lt;</m:t>
+                      <m:t>−</m:t>
+                    </m:r>
+                    <m:r>
+                      <a:rPr lang="en-US" i="1">
+                        <a:latin typeface="Cambria Math" panose="02040503050406030204" pitchFamily="18" charset="0"/>
+                        <a:ea typeface="Cambria Math" panose="02040503050406030204" pitchFamily="18" charset="0"/>
+                      </a:rPr>
+                      <m:t>∞</m:t>
+                    </m:r>
+                    <m:r>
+                      <a:rPr lang="en-US" i="1">
+                        <a:latin typeface="Cambria Math" panose="02040503050406030204" pitchFamily="18" charset="0"/>
+                        <a:ea typeface="Cambria Math" panose="02040503050406030204" pitchFamily="18" charset="0"/>
+                      </a:rPr>
+                      <m:t>&lt;</m:t>
                     </m:r>
                     <m:r>
                       <a:rPr lang="en-US" i="1">
@@ -4620,7 +4667,14 @@
                         <a:latin typeface="Cambria Math" panose="02040503050406030204" pitchFamily="18" charset="0"/>
                         <a:ea typeface="Cambria Math" panose="02040503050406030204" pitchFamily="18" charset="0"/>
                       </a:rPr>
-                      <m:t>&lt;∞</m:t>
+                      <m:t>&lt;</m:t>
+                    </m:r>
+                    <m:r>
+                      <a:rPr lang="en-US" i="1">
+                        <a:latin typeface="Cambria Math" panose="02040503050406030204" pitchFamily="18" charset="0"/>
+                        <a:ea typeface="Cambria Math" panose="02040503050406030204" pitchFamily="18" charset="0"/>
+                      </a:rPr>
+                      <m:t>∞</m:t>
                     </m:r>
                   </m:oMath>
                 </a14:m>
@@ -4710,7 +4764,13 @@
                             <a:rPr>
                               <a:latin typeface="Cambria Math" panose="02040503050406030204" pitchFamily="18" charset="0"/>
                             </a:rPr>
-                            <m:t>≤∞</m:t>
+                            <m:t>≤</m:t>
+                          </m:r>
+                          <m:r>
+                            <a:rPr>
+                              <a:latin typeface="Cambria Math" panose="02040503050406030204" pitchFamily="18" charset="0"/>
+                            </a:rPr>
+                            <m:t>∞</m:t>
                           </m:r>
                         </m:e>
                       </m:d>
@@ -5784,25 +5844,7 @@
                         <a:rPr lang="en-US" b="0" i="1" smtClean="0">
                           <a:latin typeface="Cambria Math" panose="02040503050406030204" pitchFamily="18" charset="0"/>
                         </a:rPr>
-                        <m:t>=</m:t>
-                      </m:r>
-                      <m:r>
-                        <a:rPr lang="en-US" b="0" i="1" smtClean="0">
-                          <a:latin typeface="Cambria Math" panose="02040503050406030204" pitchFamily="18" charset="0"/>
-                        </a:rPr>
-                        <m:t>0</m:t>
-                      </m:r>
-                      <m:r>
-                        <a:rPr lang="en-US" b="0" i="1" smtClean="0">
-                          <a:latin typeface="Cambria Math" panose="02040503050406030204" pitchFamily="18" charset="0"/>
-                        </a:rPr>
-                        <m:t>.</m:t>
-                      </m:r>
-                      <m:r>
-                        <a:rPr lang="en-US" b="0" i="1" smtClean="0">
-                          <a:latin typeface="Cambria Math" panose="02040503050406030204" pitchFamily="18" charset="0"/>
-                        </a:rPr>
-                        <m:t>05</m:t>
+                        <m:t>=0.05</m:t>
                       </m:r>
                     </m:oMath>
                   </m:oMathPara>
@@ -8554,20 +8596,20 @@
                   <a:buNone/>
                 </a:pPr>
                 <a:r>
-                  <a:rPr dirty="0"/>
+                  <a:rPr lang="en-US" dirty="0"/>
                   <a:t>How can we interpret the confidence interval?</a:t>
                 </a:r>
               </a:p>
               <a:p>
                 <a:pPr lvl="0"/>
                 <a:r>
-                  <a:rPr dirty="0"/>
+                  <a:rPr lang="en-US" dirty="0"/>
                   <a:t>Confidence intervals are with respect to the sampling distribution of a statistic </a:t>
                 </a:r>
                 <a14:m>
                   <m:oMath xmlns:m="http://schemas.openxmlformats.org/officeDocument/2006/math">
                     <m:r>
-                      <a:rPr>
+                      <a:rPr lang="en-US">
                         <a:latin typeface="Cambria Math" panose="02040503050406030204" pitchFamily="18" charset="0"/>
                       </a:rPr>
                       <m:t>𝑠</m:t>
@@ -8575,7 +8617,7 @@
                     <m:d>
                       <m:dPr>
                         <m:ctrlPr>
-                          <a:rPr i="1">
+                          <a:rPr lang="ar-AE" i="1">
                             <a:latin typeface="Cambria Math" panose="02040503050406030204" pitchFamily="18" charset="0"/>
                           </a:rPr>
                         </m:ctrlPr>
@@ -8585,14 +8627,14 @@
                           <m:accPr>
                             <m:chr m:val="̂"/>
                             <m:ctrlPr>
-                              <a:rPr i="1">
+                              <a:rPr lang="ar-AE" i="1">
                                 <a:latin typeface="Cambria Math" panose="02040503050406030204" pitchFamily="18" charset="0"/>
                               </a:rPr>
                             </m:ctrlPr>
                           </m:accPr>
                           <m:e>
                             <m:r>
-                              <a:rPr>
+                              <a:rPr lang="ar-AE">
                                 <a:latin typeface="Cambria Math" panose="02040503050406030204" pitchFamily="18" charset="0"/>
                               </a:rPr>
                               <m:t>ℱ</m:t>
@@ -8603,26 +8645,38 @@
                     </m:d>
                   </m:oMath>
                 </a14:m>
-                <a:endParaRPr dirty="0"/>
+                <a:endParaRPr lang="ar-AE" dirty="0"/>
               </a:p>
               <a:p>
                 <a:pPr lvl="0"/>
                 <a:r>
-                  <a:rPr dirty="0"/>
+                  <a:rPr lang="en-US" dirty="0"/>
                   <a:t>CIs are a </a:t>
                 </a:r>
                 <a:r>
-                  <a:rPr b="1" dirty="0"/>
+                  <a:rPr lang="en-US" b="1" dirty="0"/>
                   <a:t>measure of variation from sampling alone</a:t>
                 </a:r>
                 <a:r>
-                  <a:rPr dirty="0"/>
+                  <a:rPr lang="en-US" dirty="0"/>
                   <a:t> with probability </a:t>
                 </a:r>
                 <a14:m>
                   <m:oMath xmlns:m="http://schemas.openxmlformats.org/officeDocument/2006/math">
                     <m:r>
-                      <a:rPr>
+                      <a:rPr lang="en-US" b="0" i="0" smtClean="0">
+                        <a:latin typeface="Cambria Math" panose="02040503050406030204" pitchFamily="18" charset="0"/>
+                      </a:rPr>
+                      <m:t>1</m:t>
+                    </m:r>
+                    <m:r>
+                      <a:rPr lang="en-US" b="0" i="0" smtClean="0">
+                        <a:latin typeface="Cambria Math" panose="02040503050406030204" pitchFamily="18" charset="0"/>
+                      </a:rPr>
+                      <m:t>−</m:t>
+                    </m:r>
+                    <m:r>
+                      <a:rPr lang="en-US">
                         <a:latin typeface="Cambria Math" panose="02040503050406030204" pitchFamily="18" charset="0"/>
                       </a:rPr>
                       <m:t>𝛼</m:t>
@@ -8630,20 +8684,32 @@
                   </m:oMath>
                 </a14:m>
                 <a:r>
-                  <a:rPr dirty="0"/>
+                  <a:rPr lang="en-US" dirty="0"/>
                   <a:t> - the basis of hypothesis testing!</a:t>
                 </a:r>
               </a:p>
               <a:p>
                 <a:pPr lvl="0"/>
                 <a:r>
-                  <a:rPr dirty="0"/>
+                  <a:rPr lang="en-US" dirty="0"/>
                   <a:t>With probability </a:t>
                 </a:r>
                 <a14:m>
                   <m:oMath xmlns:m="http://schemas.openxmlformats.org/officeDocument/2006/math">
                     <m:r>
-                      <a:rPr>
+                      <a:rPr lang="en-US" b="0" i="0" smtClean="0">
+                        <a:latin typeface="Cambria Math" panose="02040503050406030204" pitchFamily="18" charset="0"/>
+                      </a:rPr>
+                      <m:t>1</m:t>
+                    </m:r>
+                    <m:r>
+                      <a:rPr lang="en-US" b="0" i="0" smtClean="0">
+                        <a:latin typeface="Cambria Math" panose="02040503050406030204" pitchFamily="18" charset="0"/>
+                      </a:rPr>
+                      <m:t>−</m:t>
+                    </m:r>
+                    <m:r>
+                      <a:rPr lang="en-US">
                         <a:latin typeface="Cambria Math" panose="02040503050406030204" pitchFamily="18" charset="0"/>
                       </a:rPr>
                       <m:t>𝛼</m:t>
@@ -8651,7 +8717,7 @@
                   </m:oMath>
                 </a14:m>
                 <a:r>
-                  <a:rPr dirty="0"/>
+                  <a:rPr lang="en-US" dirty="0"/>
                   <a:t> the sample statistic values computed from resamples of the population,</a:t>
                 </a:r>
                 <a14:m>
@@ -8659,7 +8725,7 @@
                     <m:sSub>
                       <m:sSubPr>
                         <m:ctrlPr>
-                          <a:rPr i="1">
+                          <a:rPr lang="ar-AE" i="1">
                             <a:latin typeface="Cambria Math" panose="02040503050406030204" pitchFamily="18" charset="0"/>
                           </a:rPr>
                         </m:ctrlPr>
@@ -8669,14 +8735,14 @@
                           <m:accPr>
                             <m:chr m:val="̂"/>
                             <m:ctrlPr>
-                              <a:rPr i="1">
+                              <a:rPr lang="ar-AE" i="1">
                                 <a:latin typeface="Cambria Math" panose="02040503050406030204" pitchFamily="18" charset="0"/>
                               </a:rPr>
                             </m:ctrlPr>
                           </m:accPr>
                           <m:e>
                             <m:r>
-                              <a:rPr>
+                              <a:rPr lang="ar-AE">
                                 <a:latin typeface="Cambria Math" panose="02040503050406030204" pitchFamily="18" charset="0"/>
                               </a:rPr>
                               <m:t>ℱ</m:t>
@@ -8686,7 +8752,7 @@
                       </m:e>
                       <m:sub>
                         <m:r>
-                          <a:rPr>
+                          <a:rPr lang="ar-AE">
                             <a:latin typeface="Cambria Math" panose="02040503050406030204" pitchFamily="18" charset="0"/>
                           </a:rPr>
                           <m:t>𝑖</m:t>
@@ -8696,36 +8762,25 @@
                   </m:oMath>
                 </a14:m>
                 <a:r>
-                  <a:rPr dirty="0"/>
-                  <a:t> are within the CI</a:t>
+                  <a:rPr lang="ar-AE" dirty="0"/>
+                  <a:t> </a:t>
+                </a:r>
+                <a:r>
+                  <a:rPr lang="en-US" dirty="0"/>
+                  <a:t>are within the CI</a:t>
                 </a:r>
               </a:p>
               <a:p>
                 <a:pPr lvl="0"/>
                 <a:r>
-                  <a:rPr dirty="0"/>
+                  <a:rPr lang="en-US" dirty="0"/>
                   <a:t>Confidence intervals </a:t>
                 </a:r>
                 <a:r>
-                  <a:rPr b="1" dirty="0"/>
-                  <a:t>do not indicate the probability the </a:t>
-                </a:r>
-                <a:r>
-                  <a:rPr b="1"/>
-                  <a:t>population </a:t>
-                </a:r>
-                <a:r>
-                  <a:rPr lang="en-US" b="1"/>
-                  <a:t>parameter</a:t>
-                </a:r>
-                <a:r>
-                  <a:rPr b="1"/>
-                  <a:t> </a:t>
-                </a:r>
-                <a:r>
-                  <a:rPr b="1" dirty="0"/>
-                  <a:t>is within a range!</a:t>
-                </a:r>
+                  <a:rPr lang="en-US" b="1" dirty="0"/>
+                  <a:t>do not indicate the probability the population parameter is within a range!</a:t>
+                </a:r>
+                <a:endParaRPr b="1" dirty="0"/>
               </a:p>
             </p:txBody>
           </p:sp>

</xml_diff>

<commit_message>
Corrected annimations, improve language, corrected typos
</commit_message>
<xml_diff>
--- a/LectureSlides/06a_WhyInferenceIsImportant.pptx
+++ b/LectureSlides/06a_WhyInferenceIsImportant.pptx
@@ -228,7 +228,7 @@
           <a:p>
             <a:fld id="{85584FAA-8D32-4F7E-9522-6C5A90DA5700}" type="datetimeFigureOut">
               <a:rPr lang="en-US" smtClean="0"/>
-              <a:t>9/14/2025</a:t>
+              <a:t>9/17/2025</a:t>
             </a:fld>
             <a:endParaRPr lang="en-US"/>
           </a:p>
@@ -846,7 +846,7 @@
           <a:p>
             <a:fld id="{241EB5C9-1307-BA42-ABA2-0BC069CD8E7F}" type="datetimeFigureOut">
               <a:rPr lang="en-US" smtClean="0"/>
-              <a:t>9/14/2025</a:t>
+              <a:t>9/17/2025</a:t>
             </a:fld>
             <a:endParaRPr lang="en-US"/>
           </a:p>
@@ -1014,7 +1014,7 @@
           <a:p>
             <a:fld id="{241EB5C9-1307-BA42-ABA2-0BC069CD8E7F}" type="datetimeFigureOut">
               <a:rPr lang="en-US" smtClean="0"/>
-              <a:t>9/14/2025</a:t>
+              <a:t>9/17/2025</a:t>
             </a:fld>
             <a:endParaRPr lang="en-US"/>
           </a:p>
@@ -1192,7 +1192,7 @@
           <a:p>
             <a:fld id="{241EB5C9-1307-BA42-ABA2-0BC069CD8E7F}" type="datetimeFigureOut">
               <a:rPr lang="en-US" smtClean="0"/>
-              <a:t>9/14/2025</a:t>
+              <a:t>9/17/2025</a:t>
             </a:fld>
             <a:endParaRPr lang="en-US"/>
           </a:p>
@@ -1360,7 +1360,7 @@
           <a:p>
             <a:fld id="{241EB5C9-1307-BA42-ABA2-0BC069CD8E7F}" type="datetimeFigureOut">
               <a:rPr lang="en-US" smtClean="0"/>
-              <a:t>9/14/2025</a:t>
+              <a:t>9/17/2025</a:t>
             </a:fld>
             <a:endParaRPr lang="en-US"/>
           </a:p>
@@ -1605,7 +1605,7 @@
           <a:p>
             <a:fld id="{241EB5C9-1307-BA42-ABA2-0BC069CD8E7F}" type="datetimeFigureOut">
               <a:rPr lang="en-US" smtClean="0"/>
-              <a:t>9/14/2025</a:t>
+              <a:t>9/17/2025</a:t>
             </a:fld>
             <a:endParaRPr lang="en-US"/>
           </a:p>
@@ -1890,7 +1890,7 @@
           <a:p>
             <a:fld id="{241EB5C9-1307-BA42-ABA2-0BC069CD8E7F}" type="datetimeFigureOut">
               <a:rPr lang="en-US" smtClean="0"/>
-              <a:t>9/14/2025</a:t>
+              <a:t>9/17/2025</a:t>
             </a:fld>
             <a:endParaRPr lang="en-US"/>
           </a:p>
@@ -2309,7 +2309,7 @@
           <a:p>
             <a:fld id="{241EB5C9-1307-BA42-ABA2-0BC069CD8E7F}" type="datetimeFigureOut">
               <a:rPr lang="en-US" smtClean="0"/>
-              <a:t>9/14/2025</a:t>
+              <a:t>9/17/2025</a:t>
             </a:fld>
             <a:endParaRPr lang="en-US"/>
           </a:p>
@@ -2426,7 +2426,7 @@
           <a:p>
             <a:fld id="{241EB5C9-1307-BA42-ABA2-0BC069CD8E7F}" type="datetimeFigureOut">
               <a:rPr lang="en-US" smtClean="0"/>
-              <a:t>9/14/2025</a:t>
+              <a:t>9/17/2025</a:t>
             </a:fld>
             <a:endParaRPr lang="en-US"/>
           </a:p>
@@ -2521,7 +2521,7 @@
           <a:p>
             <a:fld id="{241EB5C9-1307-BA42-ABA2-0BC069CD8E7F}" type="datetimeFigureOut">
               <a:rPr lang="en-US" smtClean="0"/>
-              <a:t>9/14/2025</a:t>
+              <a:t>9/17/2025</a:t>
             </a:fld>
             <a:endParaRPr lang="en-US"/>
           </a:p>
@@ -2796,7 +2796,7 @@
           <a:p>
             <a:fld id="{241EB5C9-1307-BA42-ABA2-0BC069CD8E7F}" type="datetimeFigureOut">
               <a:rPr lang="en-US" smtClean="0"/>
-              <a:t>9/14/2025</a:t>
+              <a:t>9/17/2025</a:t>
             </a:fld>
             <a:endParaRPr lang="en-US"/>
           </a:p>
@@ -3048,7 +3048,7 @@
           <a:p>
             <a:fld id="{241EB5C9-1307-BA42-ABA2-0BC069CD8E7F}" type="datetimeFigureOut">
               <a:rPr lang="en-US" smtClean="0"/>
-              <a:t>9/14/2025</a:t>
+              <a:t>9/17/2025</a:t>
             </a:fld>
             <a:endParaRPr lang="en-US"/>
           </a:p>
@@ -3259,7 +3259,7 @@
           <a:p>
             <a:fld id="{241EB5C9-1307-BA42-ABA2-0BC069CD8E7F}" type="datetimeFigureOut">
               <a:rPr lang="en-US" smtClean="0"/>
-              <a:t>9/14/2025</a:t>
+              <a:t>9/17/2025</a:t>
             </a:fld>
             <a:endParaRPr lang="en-US"/>
           </a:p>
@@ -3703,30 +3703,6 @@
           </a:p>
         </p:txBody>
       </p:sp>
-      <p:sp>
-        <p:nvSpPr>
-          <p:cNvPr id="4" name="Date Placeholder 3"/>
-          <p:cNvSpPr>
-            <a:spLocks noGrp="1"/>
-          </p:cNvSpPr>
-          <p:nvPr>
-            <p:ph type="dt" sz="half" idx="10"/>
-          </p:nvPr>
-        </p:nvSpPr>
-        <p:spPr/>
-        <p:txBody>
-          <a:bodyPr/>
-          <a:lstStyle/>
-          <a:p>
-            <a:pPr marL="0" lvl="0" indent="0">
-              <a:buNone/>
-            </a:pPr>
-            <a:r>
-              <a:t>09/04/2023</a:t>
-            </a:r>
-          </a:p>
-        </p:txBody>
-      </p:sp>
       <p:pic>
         <p:nvPicPr>
           <p:cNvPr id="5" name="Picture 2" descr="Image result for harvard extension school logo">
@@ -3805,7 +3781,7 @@
             <a:pPr algn="ctr"/>
             <a:r>
               <a:rPr lang="en-US" sz="1100" dirty="0"/>
-              <a:t>Copyright 2018, 2019, 2020, 2021, 2022, 2023 2024, Stephen F Elston. All rights reserved</a:t>
+              <a:t>Copyright 2018, 2019, 2020, 2021, 2022, 2023 2024, 2025, Stephen F Elston. All rights reserved</a:t>
             </a:r>
             <a:r>
               <a:rPr lang="en-US" dirty="0"/>
@@ -3877,8 +3853,8 @@
           </a:p>
         </p:txBody>
       </p:sp>
-      <mc:AlternateContent xmlns:mc="http://schemas.openxmlformats.org/markup-compatibility/2006" xmlns:a14="http://schemas.microsoft.com/office/drawing/2010/main">
-        <mc:Choice Requires="a14">
+      <mc:AlternateContent xmlns:mc="http://schemas.openxmlformats.org/markup-compatibility/2006">
+        <mc:Choice xmlns:a14="http://schemas.microsoft.com/office/drawing/2010/main" Requires="a14">
           <p:sp>
             <p:nvSpPr>
               <p:cNvPr id="3" name="Content Placeholder 2">
@@ -3938,16 +3914,10 @@
                 <a:pPr lvl="0"/>
                 <a:r>
                   <a:rPr lang="en-US" dirty="0"/>
-                  <a:t>Can repetitively draw samples from the population,</a:t>
+                  <a:t>Can repetitively draw samples from the population, </a:t>
                 </a:r>
                 <a14:m>
                   <m:oMath xmlns:m="http://schemas.openxmlformats.org/officeDocument/2006/math">
-                    <m:r>
-                      <a:rPr lang="en-US" b="0" i="0" smtClean="0">
-                        <a:latin typeface="Cambria Math" panose="02040503050406030204" pitchFamily="18" charset="0"/>
-                      </a:rPr>
-                      <m:t> </m:t>
-                    </m:r>
                     <m:acc>
                       <m:accPr>
                         <m:chr m:val="̂"/>
@@ -4035,7 +4005,7 @@
             </p:txBody>
           </p:sp>
         </mc:Choice>
-        <mc:Fallback xmlns="">
+        <mc:Fallback>
           <p:sp>
             <p:nvSpPr>
               <p:cNvPr id="3" name="Content Placeholder 2">
@@ -5174,7 +5144,7 @@
         </p:nvSpPr>
         <p:spPr>
           <a:xfrm>
-            <a:off x="4216400" y="4906392"/>
+            <a:off x="4064465" y="4747714"/>
             <a:ext cx="5080000" cy="336607"/>
           </a:xfrm>
           <a:prstGeom prst="rect">
@@ -5521,26 +5491,35 @@
                                   </p:childTnLst>
                                 </p:cTn>
                               </p:par>
-                            </p:childTnLst>
-                          </p:cTn>
-                        </p:par>
-                      </p:childTnLst>
-                    </p:cTn>
-                  </p:par>
-                  <p:par>
-                    <p:cTn id="17" fill="hold">
-                      <p:stCondLst>
-                        <p:cond delay="indefinite"/>
-                      </p:stCondLst>
-                      <p:childTnLst>
-                        <p:par>
-                          <p:cTn id="18" fill="hold">
-                            <p:stCondLst>
-                              <p:cond delay="0"/>
-                            </p:stCondLst>
-                            <p:childTnLst>
                               <p:par>
-                                <p:cTn id="19" presetID="1" presetClass="entr" presetSubtype="0" fill="hold" grpId="0" nodeType="clickEffect">
+                                <p:cTn id="17" presetID="1" presetClass="entr" presetSubtype="0" fill="hold" grpId="0" nodeType="withEffect">
+                                  <p:stCondLst>
+                                    <p:cond delay="0"/>
+                                  </p:stCondLst>
+                                  <p:childTnLst>
+                                    <p:set>
+                                      <p:cBhvr>
+                                        <p:cTn id="18" dur="1" fill="hold">
+                                          <p:stCondLst>
+                                            <p:cond delay="0"/>
+                                          </p:stCondLst>
+                                        </p:cTn>
+                                        <p:tgtEl>
+                                          <p:spTgt spid="5"/>
+                                        </p:tgtEl>
+                                        <p:attrNameLst>
+                                          <p:attrName>style.visibility</p:attrName>
+                                        </p:attrNameLst>
+                                      </p:cBhvr>
+                                      <p:to>
+                                        <p:strVal val="visible"/>
+                                      </p:to>
+                                    </p:set>
+                                  </p:childTnLst>
+                                </p:cTn>
+                              </p:par>
+                              <p:par>
+                                <p:cTn id="19" presetID="1" presetClass="entr" presetSubtype="0" fill="hold" nodeType="withEffect">
                                   <p:stCondLst>
                                     <p:cond delay="0"/>
                                   </p:stCondLst>
@@ -5553,7 +5532,7 @@
                                           </p:stCondLst>
                                         </p:cTn>
                                         <p:tgtEl>
-                                          <p:spTgt spid="5"/>
+                                          <p:spTgt spid="7"/>
                                         </p:tgtEl>
                                         <p:attrNameLst>
                                           <p:attrName>style.visibility</p:attrName>
@@ -5580,7 +5559,7 @@
                                           </p:stCondLst>
                                         </p:cTn>
                                         <p:tgtEl>
-                                          <p:spTgt spid="7"/>
+                                          <p:spTgt spid="8"/>
                                         </p:tgtEl>
                                         <p:attrNameLst>
                                           <p:attrName>style.visibility</p:attrName>
@@ -5594,7 +5573,7 @@
                                 </p:cTn>
                               </p:par>
                               <p:par>
-                                <p:cTn id="23" presetID="1" presetClass="entr" presetSubtype="0" fill="hold" nodeType="withEffect">
+                                <p:cTn id="23" presetID="1" presetClass="entr" presetSubtype="0" fill="hold" grpId="0" nodeType="withEffect">
                                   <p:stCondLst>
                                     <p:cond delay="0"/>
                                   </p:stCondLst>
@@ -5607,7 +5586,7 @@
                                           </p:stCondLst>
                                         </p:cTn>
                                         <p:tgtEl>
-                                          <p:spTgt spid="8"/>
+                                          <p:spTgt spid="14"/>
                                         </p:tgtEl>
                                         <p:attrNameLst>
                                           <p:attrName>style.visibility</p:attrName>
@@ -5634,33 +5613,6 @@
                                           </p:stCondLst>
                                         </p:cTn>
                                         <p:tgtEl>
-                                          <p:spTgt spid="14"/>
-                                        </p:tgtEl>
-                                        <p:attrNameLst>
-                                          <p:attrName>style.visibility</p:attrName>
-                                        </p:attrNameLst>
-                                      </p:cBhvr>
-                                      <p:to>
-                                        <p:strVal val="visible"/>
-                                      </p:to>
-                                    </p:set>
-                                  </p:childTnLst>
-                                </p:cTn>
-                              </p:par>
-                              <p:par>
-                                <p:cTn id="27" presetID="1" presetClass="entr" presetSubtype="0" fill="hold" grpId="0" nodeType="withEffect">
-                                  <p:stCondLst>
-                                    <p:cond delay="0"/>
-                                  </p:stCondLst>
-                                  <p:childTnLst>
-                                    <p:set>
-                                      <p:cBhvr>
-                                        <p:cTn id="28" dur="1" fill="hold">
-                                          <p:stCondLst>
-                                            <p:cond delay="0"/>
-                                          </p:stCondLst>
-                                        </p:cTn>
-                                        <p:tgtEl>
                                           <p:spTgt spid="15"/>
                                         </p:tgtEl>
                                         <p:attrNameLst>
@@ -5681,26 +5633,26 @@
                     </p:cTn>
                   </p:par>
                   <p:par>
-                    <p:cTn id="29" fill="hold">
+                    <p:cTn id="27" fill="hold">
                       <p:stCondLst>
                         <p:cond delay="indefinite"/>
                       </p:stCondLst>
                       <p:childTnLst>
                         <p:par>
-                          <p:cTn id="30" fill="hold">
+                          <p:cTn id="28" fill="hold">
                             <p:stCondLst>
                               <p:cond delay="0"/>
                             </p:stCondLst>
                             <p:childTnLst>
                               <p:par>
-                                <p:cTn id="31" presetID="1" presetClass="entr" presetSubtype="0" fill="hold" nodeType="clickEffect">
+                                <p:cTn id="29" presetID="1" presetClass="entr" presetSubtype="0" fill="hold" nodeType="clickEffect">
                                   <p:stCondLst>
                                     <p:cond delay="0"/>
                                   </p:stCondLst>
                                   <p:childTnLst>
                                     <p:set>
                                       <p:cBhvr>
-                                        <p:cTn id="32" dur="1" fill="hold">
+                                        <p:cTn id="30" dur="1" fill="hold">
                                           <p:stCondLst>
                                             <p:cond delay="0"/>
                                           </p:stCondLst>
@@ -5800,8 +5752,8 @@
           </a:p>
         </p:txBody>
       </p:sp>
-      <mc:AlternateContent xmlns:mc="http://schemas.openxmlformats.org/markup-compatibility/2006" xmlns:a14="http://schemas.microsoft.com/office/drawing/2010/main">
-        <mc:Choice Requires="a14">
+      <mc:AlternateContent xmlns:mc="http://schemas.openxmlformats.org/markup-compatibility/2006">
+        <mc:Choice xmlns:a14="http://schemas.microsoft.com/office/drawing/2010/main" Requires="a14">
           <p:sp>
             <p:nvSpPr>
               <p:cNvPr id="3" name="Content Placeholder 2"/>
@@ -6259,7 +6211,7 @@
                 </a14:m>
                 <a:r>
                   <a:rPr lang="en-US" dirty="0"/>
-                  <a:t> the right and left tail probabilities are:</a:t>
+                  <a:t> the left and right tail probabilities are:</a:t>
                 </a:r>
               </a:p>
               <a:p>
@@ -6383,7 +6335,7 @@
                                   <a:latin typeface="Cambria Math" panose="02040503050406030204" pitchFamily="18" charset="0"/>
                                   <a:ea typeface="Cambria Math" panose="02040503050406030204" pitchFamily="18" charset="0"/>
                                 </a:rPr>
-                                <m:t>𝑢𝑝𝑝𝑒𝑟</m:t>
+                                <m:t>𝑙𝑜𝑤𝑒𝑟</m:t>
                               </m:r>
                             </m:sub>
                           </m:sSub>
@@ -6480,7 +6432,7 @@
                                   <a:latin typeface="Cambria Math" panose="02040503050406030204" pitchFamily="18" charset="0"/>
                                   <a:ea typeface="Cambria Math" panose="02040503050406030204" pitchFamily="18" charset="0"/>
                                 </a:rPr>
-                                <m:t>𝑙𝑜𝑤𝑒𝑟</m:t>
+                                <m:t>𝑢𝑝𝑝𝑒𝑟</m:t>
                               </m:r>
                             </m:sub>
                           </m:sSub>
@@ -6522,7 +6474,7 @@
             </p:txBody>
           </p:sp>
         </mc:Choice>
-        <mc:Fallback xmlns="">
+        <mc:Fallback>
           <p:sp>
             <p:nvSpPr>
               <p:cNvPr id="3" name="Content Placeholder 2"/>
@@ -6879,8 +6831,8 @@
           </a:p>
         </p:txBody>
       </p:sp>
-      <mc:AlternateContent xmlns:mc="http://schemas.openxmlformats.org/markup-compatibility/2006" xmlns:a14="http://schemas.microsoft.com/office/drawing/2010/main">
-        <mc:Choice Requires="a14">
+      <mc:AlternateContent xmlns:mc="http://schemas.openxmlformats.org/markup-compatibility/2006">
+        <mc:Choice xmlns:a14="http://schemas.microsoft.com/office/drawing/2010/main" Requires="a14">
           <p:sp>
             <p:nvSpPr>
               <p:cNvPr id="3" name="Content Placeholder 2"/>
@@ -7039,7 +6991,7 @@
                             <a:rPr lang="ar-AE">
                               <a:latin typeface="Cambria Math" panose="02040503050406030204" pitchFamily="18" charset="0"/>
                             </a:rPr>
-                            <m:t>≤</m:t>
+                            <m:t>≥</m:t>
                           </m:r>
                           <m:sSub>
                             <m:sSubPr>
@@ -7072,7 +7024,14 @@
                                   <a:latin typeface="Cambria Math" panose="02040503050406030204" pitchFamily="18" charset="0"/>
                                   <a:ea typeface="Cambria Math" panose="02040503050406030204" pitchFamily="18" charset="0"/>
                                 </a:rPr>
-                                <m:t>𝑝𝑝𝑒𝑟</m:t>
+                                <m:t>𝑝𝑝𝑒</m:t>
+                              </m:r>
+                              <m:r>
+                                <a:rPr lang="en-US" b="0" i="1" smtClean="0">
+                                  <a:latin typeface="Cambria Math" panose="02040503050406030204" pitchFamily="18" charset="0"/>
+                                  <a:ea typeface="Cambria Math" panose="02040503050406030204" pitchFamily="18" charset="0"/>
+                                </a:rPr>
+                                <m:t>𝑟</m:t>
                               </m:r>
                             </m:sub>
                           </m:sSub>
@@ -7137,7 +7096,7 @@
                             <a:rPr lang="ar-AE">
                               <a:latin typeface="Cambria Math" panose="02040503050406030204" pitchFamily="18" charset="0"/>
                             </a:rPr>
-                            <m:t>≥</m:t>
+                            <m:t>≤</m:t>
                           </m:r>
                           <m:sSub>
                             <m:sSubPr>
@@ -7228,7 +7187,7 @@
                 </a14:m>
                 <a:r>
                   <a:rPr lang="en-US" dirty="0"/>
-                  <a:t> one-sided upper CI:</a:t>
+                  <a:t> one-sided lower CI:</a:t>
                 </a:r>
               </a:p>
               <a:p>
@@ -7322,7 +7281,14 @@
                                   <a:latin typeface="Cambria Math" panose="02040503050406030204" pitchFamily="18" charset="0"/>
                                   <a:ea typeface="Cambria Math" panose="02040503050406030204" pitchFamily="18" charset="0"/>
                                 </a:rPr>
-                                <m:t>𝑢𝑝𝑝𝑒𝑟</m:t>
+                                <m:t>𝑙𝑜𝑤</m:t>
+                              </m:r>
+                              <m:r>
+                                <a:rPr lang="en-US" b="0" i="1" smtClean="0">
+                                  <a:latin typeface="Cambria Math" panose="02040503050406030204" pitchFamily="18" charset="0"/>
+                                  <a:ea typeface="Cambria Math" panose="02040503050406030204" pitchFamily="18" charset="0"/>
+                                </a:rPr>
+                                <m:t>𝑒𝑟</m:t>
                               </m:r>
                             </m:sub>
                           </m:sSub>
@@ -7387,7 +7353,7 @@
                 </a14:m>
                 <a:r>
                   <a:rPr lang="en-US" dirty="0"/>
-                  <a:t> one-sided lower CI:</a:t>
+                  <a:t> one-sided upper CI:</a:t>
                 </a:r>
               </a:p>
               <a:p>
@@ -7451,7 +7417,14 @@
                                   <a:latin typeface="Cambria Math" panose="02040503050406030204" pitchFamily="18" charset="0"/>
                                   <a:ea typeface="Cambria Math" panose="02040503050406030204" pitchFamily="18" charset="0"/>
                                 </a:rPr>
-                                <m:t>𝑙𝑜𝑤𝑒𝑟</m:t>
+                                <m:t>𝑢𝑝𝑝</m:t>
+                              </m:r>
+                              <m:r>
+                                <a:rPr lang="en-US" b="0" i="1" smtClean="0">
+                                  <a:latin typeface="Cambria Math" panose="02040503050406030204" pitchFamily="18" charset="0"/>
+                                  <a:ea typeface="Cambria Math" panose="02040503050406030204" pitchFamily="18" charset="0"/>
+                                </a:rPr>
+                                <m:t>𝑒𝑟</m:t>
                               </m:r>
                             </m:sub>
                           </m:sSub>
@@ -7489,7 +7462,7 @@
             </p:txBody>
           </p:sp>
         </mc:Choice>
-        <mc:Fallback xmlns="">
+        <mc:Fallback>
           <p:sp>
             <p:nvSpPr>
               <p:cNvPr id="3" name="Content Placeholder 2"/>
@@ -7983,8 +7956,8 @@
           </a:p>
         </p:txBody>
       </p:sp>
-      <mc:AlternateContent xmlns:mc="http://schemas.openxmlformats.org/markup-compatibility/2006" xmlns:a14="http://schemas.microsoft.com/office/drawing/2010/main">
-        <mc:Choice Requires="a14">
+      <mc:AlternateContent xmlns:mc="http://schemas.openxmlformats.org/markup-compatibility/2006">
+        <mc:Choice xmlns:a14="http://schemas.microsoft.com/office/drawing/2010/main" Requires="a14">
           <p:sp>
             <p:nvSpPr>
               <p:cNvPr id="4" name="Text Placeholder 3"/>
@@ -8091,8 +8064,12 @@
                   <a:buChar char="•"/>
                 </a:pPr>
                 <a:r>
+                  <a:rPr lang="en-US" sz="1600" dirty="0"/>
+                  <a:t>Vertical</a:t>
+                </a:r>
+                <a:r>
                   <a:rPr sz="1600" dirty="0"/>
-                  <a:t>Horizontal double arrow shows the range of the </a:t>
+                  <a:t> double arrow shows the range of the </a:t>
                 </a:r>
                 <a:r>
                   <a:rPr lang="en-US" sz="1600" b="1" dirty="0"/>
@@ -8106,8 +8083,12 @@
                   <a:buChar char="•"/>
                 </a:pPr>
                 <a:r>
+                  <a:rPr lang="en-US" sz="1600" dirty="0"/>
+                  <a:t>Horizontal</a:t>
+                </a:r>
+                <a:r>
                   <a:rPr sz="1600" dirty="0"/>
-                  <a:t>Vertical double arrow shows the part of the distribution within the confidence intervals</a:t>
+                  <a:t> double arrow shows the part of the distribution within the confidence intervals</a:t>
                 </a:r>
               </a:p>
               <a:p>
@@ -8124,7 +8105,7 @@
             </p:txBody>
           </p:sp>
         </mc:Choice>
-        <mc:Fallback xmlns="">
+        <mc:Fallback>
           <p:sp>
             <p:nvSpPr>
               <p:cNvPr id="4" name="Text Placeholder 3"/>
@@ -8252,8 +8233,8 @@
         </p:nvCxnSpPr>
         <p:spPr>
           <a:xfrm>
-            <a:off x="3640975" y="3088178"/>
-            <a:ext cx="897774" cy="320040"/>
+            <a:off x="3050594" y="3143980"/>
+            <a:ext cx="2252926" cy="1211675"/>
           </a:xfrm>
           <a:prstGeom prst="straightConnector1">
             <a:avLst/>
@@ -8296,8 +8277,8 @@
         </p:nvCxnSpPr>
         <p:spPr>
           <a:xfrm>
-            <a:off x="3566160" y="2186247"/>
-            <a:ext cx="2464724" cy="1928553"/>
+            <a:off x="3350029" y="2157152"/>
+            <a:ext cx="1188720" cy="570484"/>
           </a:xfrm>
           <a:prstGeom prst="straightConnector1">
             <a:avLst/>
@@ -8434,33 +8415,6 @@
                                   </p:childTnLst>
                                 </p:cTn>
                               </p:par>
-                              <p:par>
-                                <p:cTn id="11" presetID="1" presetClass="entr" presetSubtype="0" fill="hold" nodeType="withEffect">
-                                  <p:stCondLst>
-                                    <p:cond delay="0"/>
-                                  </p:stCondLst>
-                                  <p:childTnLst>
-                                    <p:set>
-                                      <p:cBhvr>
-                                        <p:cTn id="12" dur="1" fill="hold">
-                                          <p:stCondLst>
-                                            <p:cond delay="0"/>
-                                          </p:stCondLst>
-                                        </p:cTn>
-                                        <p:tgtEl>
-                                          <p:spTgt spid="7"/>
-                                        </p:tgtEl>
-                                        <p:attrNameLst>
-                                          <p:attrName>style.visibility</p:attrName>
-                                        </p:attrNameLst>
-                                      </p:cBhvr>
-                                      <p:to>
-                                        <p:strVal val="visible"/>
-                                      </p:to>
-                                    </p:set>
-                                  </p:childTnLst>
-                                </p:cTn>
-                              </p:par>
                             </p:childTnLst>
                           </p:cTn>
                         </p:par>
@@ -8468,26 +8422,26 @@
                     </p:cTn>
                   </p:par>
                   <p:par>
-                    <p:cTn id="13" fill="hold">
+                    <p:cTn id="11" fill="hold">
                       <p:stCondLst>
                         <p:cond delay="indefinite"/>
                       </p:stCondLst>
                       <p:childTnLst>
                         <p:par>
-                          <p:cTn id="14" fill="hold">
+                          <p:cTn id="12" fill="hold">
                             <p:stCondLst>
                               <p:cond delay="0"/>
                             </p:stCondLst>
                             <p:childTnLst>
                               <p:par>
-                                <p:cTn id="15" presetID="1" presetClass="entr" presetSubtype="0" fill="hold" nodeType="clickEffect">
+                                <p:cTn id="13" presetID="1" presetClass="entr" presetSubtype="0" fill="hold" nodeType="clickEffect">
                                   <p:stCondLst>
                                     <p:cond delay="0"/>
                                   </p:stCondLst>
                                   <p:childTnLst>
                                     <p:set>
                                       <p:cBhvr>
-                                        <p:cTn id="16" dur="1" fill="hold">
+                                        <p:cTn id="14" dur="1" fill="hold">
                                           <p:stCondLst>
                                             <p:cond delay="0"/>
                                           </p:stCondLst>
@@ -8511,14 +8465,14 @@
                                 </p:cTn>
                               </p:par>
                               <p:par>
-                                <p:cTn id="17" presetID="1" presetClass="entr" presetSubtype="0" fill="hold" nodeType="withEffect">
+                                <p:cTn id="15" presetID="1" presetClass="entr" presetSubtype="0" fill="hold" nodeType="withEffect">
                                   <p:stCondLst>
                                     <p:cond delay="0"/>
                                   </p:stCondLst>
                                   <p:childTnLst>
                                     <p:set>
                                       <p:cBhvr>
-                                        <p:cTn id="18" dur="1" fill="hold">
+                                        <p:cTn id="16" dur="1" fill="hold">
                                           <p:stCondLst>
                                             <p:cond delay="0"/>
                                           </p:stCondLst>
@@ -8544,19 +8498,50 @@
                     </p:cTn>
                   </p:par>
                   <p:par>
-                    <p:cTn id="19" fill="hold">
+                    <p:cTn id="17" fill="hold">
                       <p:stCondLst>
                         <p:cond delay="indefinite"/>
                       </p:stCondLst>
                       <p:childTnLst>
                         <p:par>
-                          <p:cTn id="20" fill="hold">
+                          <p:cTn id="18" fill="hold">
                             <p:stCondLst>
                               <p:cond delay="0"/>
                             </p:stCondLst>
                             <p:childTnLst>
                               <p:par>
-                                <p:cTn id="21" presetID="1" presetClass="entr" presetSubtype="0" fill="hold" nodeType="clickEffect">
+                                <p:cTn id="19" presetID="1" presetClass="entr" presetSubtype="0" fill="hold" nodeType="clickEffect">
+                                  <p:stCondLst>
+                                    <p:cond delay="0"/>
+                                  </p:stCondLst>
+                                  <p:childTnLst>
+                                    <p:set>
+                                      <p:cBhvr>
+                                        <p:cTn id="20" dur="1" fill="hold">
+                                          <p:stCondLst>
+                                            <p:cond delay="0"/>
+                                          </p:stCondLst>
+                                        </p:cTn>
+                                        <p:tgtEl>
+                                          <p:spTgt spid="4">
+                                            <p:txEl>
+                                              <p:pRg st="3" end="3"/>
+                                            </p:txEl>
+                                          </p:spTgt>
+                                        </p:tgtEl>
+                                        <p:attrNameLst>
+                                          <p:attrName>style.visibility</p:attrName>
+                                        </p:attrNameLst>
+                                      </p:cBhvr>
+                                      <p:to>
+                                        <p:strVal val="visible"/>
+                                      </p:to>
+                                    </p:set>
+                                  </p:childTnLst>
+                                </p:cTn>
+                              </p:par>
+                              <p:par>
+                                <p:cTn id="21" presetID="1" presetClass="entr" presetSubtype="0" fill="hold" nodeType="withEffect">
                                   <p:stCondLst>
                                     <p:cond delay="0"/>
                                   </p:stCondLst>
@@ -8569,11 +8554,7 @@
                                           </p:stCondLst>
                                         </p:cTn>
                                         <p:tgtEl>
-                                          <p:spTgt spid="4">
-                                            <p:txEl>
-                                              <p:pRg st="3" end="3"/>
-                                            </p:txEl>
-                                          </p:spTgt>
+                                          <p:spTgt spid="7"/>
                                         </p:tgtEl>
                                         <p:attrNameLst>
                                           <p:attrName>style.visibility</p:attrName>
@@ -10751,7 +10732,15 @@
                 </a:r>
                 <a:r>
                   <a:rPr sz="1600" b="1" dirty="0"/>
-                  <a:t>variation this great or greater arises from random sampling alone</a:t>
+                  <a:t>variation </a:t>
+                </a:r>
+                <a:r>
+                  <a:rPr lang="en-US" sz="1600" b="1" dirty="0"/>
+                  <a:t>of the statistic </a:t>
+                </a:r>
+                <a:r>
+                  <a:rPr sz="1600" b="1" dirty="0"/>
+                  <a:t>this great or greater arises from random sampling alone</a:t>
                 </a:r>
               </a:p>
               <a:p>
@@ -10812,7 +10801,7 @@
               <a:blipFill>
                 <a:blip r:embed="rId2"/>
                 <a:stretch>
-                  <a:fillRect l="-865" t="-501" r="-865"/>
+                  <a:fillRect l="-865" t="-501"/>
                 </a:stretch>
               </a:blipFill>
             </p:spPr>
@@ -11626,6 +11615,196 @@
   <p:clrMapOvr>
     <a:masterClrMapping/>
   </p:clrMapOvr>
+  <p:timing>
+    <p:tnLst>
+      <p:par>
+        <p:cTn id="1" dur="indefinite" restart="never" nodeType="tmRoot">
+          <p:childTnLst>
+            <p:seq concurrent="1" nextAc="seek">
+              <p:cTn id="2" dur="indefinite" nodeType="mainSeq">
+                <p:childTnLst>
+                  <p:par>
+                    <p:cTn id="3" fill="hold">
+                      <p:stCondLst>
+                        <p:cond delay="indefinite"/>
+                      </p:stCondLst>
+                      <p:childTnLst>
+                        <p:par>
+                          <p:cTn id="4" fill="hold">
+                            <p:stCondLst>
+                              <p:cond delay="0"/>
+                            </p:stCondLst>
+                            <p:childTnLst>
+                              <p:par>
+                                <p:cTn id="5" presetID="1" presetClass="entr" presetSubtype="0" fill="hold" nodeType="clickEffect">
+                                  <p:stCondLst>
+                                    <p:cond delay="0"/>
+                                  </p:stCondLst>
+                                  <p:childTnLst>
+                                    <p:set>
+                                      <p:cBhvr>
+                                        <p:cTn id="6" dur="1" fill="hold">
+                                          <p:stCondLst>
+                                            <p:cond delay="0"/>
+                                          </p:stCondLst>
+                                        </p:cTn>
+                                        <p:tgtEl>
+                                          <p:spTgt spid="3">
+                                            <p:txEl>
+                                              <p:pRg st="1" end="1"/>
+                                            </p:txEl>
+                                          </p:spTgt>
+                                        </p:tgtEl>
+                                        <p:attrNameLst>
+                                          <p:attrName>style.visibility</p:attrName>
+                                        </p:attrNameLst>
+                                      </p:cBhvr>
+                                      <p:to>
+                                        <p:strVal val="visible"/>
+                                      </p:to>
+                                    </p:set>
+                                  </p:childTnLst>
+                                </p:cTn>
+                              </p:par>
+                              <p:par>
+                                <p:cTn id="7" presetID="1" presetClass="entr" presetSubtype="0" fill="hold" nodeType="withEffect">
+                                  <p:stCondLst>
+                                    <p:cond delay="0"/>
+                                  </p:stCondLst>
+                                  <p:childTnLst>
+                                    <p:set>
+                                      <p:cBhvr>
+                                        <p:cTn id="8" dur="1" fill="hold">
+                                          <p:stCondLst>
+                                            <p:cond delay="0"/>
+                                          </p:stCondLst>
+                                        </p:cTn>
+                                        <p:tgtEl>
+                                          <p:spTgt spid="3">
+                                            <p:txEl>
+                                              <p:pRg st="2" end="2"/>
+                                            </p:txEl>
+                                          </p:spTgt>
+                                        </p:tgtEl>
+                                        <p:attrNameLst>
+                                          <p:attrName>style.visibility</p:attrName>
+                                        </p:attrNameLst>
+                                      </p:cBhvr>
+                                      <p:to>
+                                        <p:strVal val="visible"/>
+                                      </p:to>
+                                    </p:set>
+                                  </p:childTnLst>
+                                </p:cTn>
+                              </p:par>
+                              <p:par>
+                                <p:cTn id="9" presetID="1" presetClass="entr" presetSubtype="0" fill="hold" nodeType="withEffect">
+                                  <p:stCondLst>
+                                    <p:cond delay="0"/>
+                                  </p:stCondLst>
+                                  <p:childTnLst>
+                                    <p:set>
+                                      <p:cBhvr>
+                                        <p:cTn id="10" dur="1" fill="hold">
+                                          <p:stCondLst>
+                                            <p:cond delay="0"/>
+                                          </p:stCondLst>
+                                        </p:cTn>
+                                        <p:tgtEl>
+                                          <p:spTgt spid="3">
+                                            <p:txEl>
+                                              <p:pRg st="3" end="3"/>
+                                            </p:txEl>
+                                          </p:spTgt>
+                                        </p:tgtEl>
+                                        <p:attrNameLst>
+                                          <p:attrName>style.visibility</p:attrName>
+                                        </p:attrNameLst>
+                                      </p:cBhvr>
+                                      <p:to>
+                                        <p:strVal val="visible"/>
+                                      </p:to>
+                                    </p:set>
+                                  </p:childTnLst>
+                                </p:cTn>
+                              </p:par>
+                            </p:childTnLst>
+                          </p:cTn>
+                        </p:par>
+                      </p:childTnLst>
+                    </p:cTn>
+                  </p:par>
+                  <p:par>
+                    <p:cTn id="11" fill="hold">
+                      <p:stCondLst>
+                        <p:cond delay="indefinite"/>
+                      </p:stCondLst>
+                      <p:childTnLst>
+                        <p:par>
+                          <p:cTn id="12" fill="hold">
+                            <p:stCondLst>
+                              <p:cond delay="0"/>
+                            </p:stCondLst>
+                            <p:childTnLst>
+                              <p:par>
+                                <p:cTn id="13" presetID="1" presetClass="entr" presetSubtype="0" fill="hold" nodeType="clickEffect">
+                                  <p:stCondLst>
+                                    <p:cond delay="0"/>
+                                  </p:stCondLst>
+                                  <p:childTnLst>
+                                    <p:set>
+                                      <p:cBhvr>
+                                        <p:cTn id="14" dur="1" fill="hold">
+                                          <p:stCondLst>
+                                            <p:cond delay="0"/>
+                                          </p:stCondLst>
+                                        </p:cTn>
+                                        <p:tgtEl>
+                                          <p:spTgt spid="3">
+                                            <p:txEl>
+                                              <p:pRg st="4" end="4"/>
+                                            </p:txEl>
+                                          </p:spTgt>
+                                        </p:tgtEl>
+                                        <p:attrNameLst>
+                                          <p:attrName>style.visibility</p:attrName>
+                                        </p:attrNameLst>
+                                      </p:cBhvr>
+                                      <p:to>
+                                        <p:strVal val="visible"/>
+                                      </p:to>
+                                    </p:set>
+                                  </p:childTnLst>
+                                </p:cTn>
+                              </p:par>
+                            </p:childTnLst>
+                          </p:cTn>
+                        </p:par>
+                      </p:childTnLst>
+                    </p:cTn>
+                  </p:par>
+                </p:childTnLst>
+              </p:cTn>
+              <p:prevCondLst>
+                <p:cond evt="onPrev" delay="0">
+                  <p:tgtEl>
+                    <p:sldTgt/>
+                  </p:tgtEl>
+                </p:cond>
+              </p:prevCondLst>
+              <p:nextCondLst>
+                <p:cond evt="onNext" delay="0">
+                  <p:tgtEl>
+                    <p:sldTgt/>
+                  </p:tgtEl>
+                </p:cond>
+              </p:nextCondLst>
+            </p:seq>
+          </p:childTnLst>
+        </p:cTn>
+      </p:par>
+    </p:tnLst>
+  </p:timing>
 </p:sld>
 </file>
 
@@ -14862,7 +15041,15 @@
             <a:pPr lvl="0"/>
             <a:r>
               <a:rPr dirty="0"/>
-              <a:t>Consider the theoretical basis of the relationship. e.g., can known science add understanding?</a:t>
+              <a:t>Consider the theoretical basis of the relationship. e.g., can known science </a:t>
+            </a:r>
+            <a:r>
+              <a:rPr lang="en-US" dirty="0"/>
+              <a:t>or domain knowledge </a:t>
+            </a:r>
+            <a:r>
+              <a:rPr dirty="0"/>
+              <a:t>add understanding?</a:t>
             </a:r>
             <a:endParaRPr lang="en-US" dirty="0"/>
           </a:p>

</xml_diff>